<commit_message>
Change position of infrastructure diagrams
</commit_message>
<xml_diff>
--- a/cah-presentation.pptx
+++ b/cah-presentation.pptx
@@ -4506,7 +4506,7 @@
         </p:blipFill>
         <p:spPr>
           <a:xfrm>
-            <a:off x="3890962" y="2663031"/>
+            <a:off x="3600000" y="2340000"/>
             <a:ext cx="4410075" cy="2676525"/>
           </a:xfrm>
         </p:spPr>
@@ -4621,7 +4621,7 @@
         </p:blipFill>
         <p:spPr>
           <a:xfrm>
-            <a:off x="3989807" y="2663029"/>
+            <a:off x="3600000" y="2340000"/>
             <a:ext cx="4467225" cy="2838450"/>
           </a:xfrm>
         </p:spPr>

</xml_diff>

<commit_message>
Add stackdriver & sentry to infrastructure
</commit_message>
<xml_diff>
--- a/cah-presentation.pptx
+++ b/cah-presentation.pptx
@@ -5,7 +5,7 @@
     <p:sldMasterId id="2147483648" r:id="rId1"/>
   </p:sldMasterIdLst>
   <p:notesMasterIdLst>
-    <p:notesMasterId r:id="rId16"/>
+    <p:notesMasterId r:id="rId18"/>
   </p:notesMasterIdLst>
   <p:sldIdLst>
     <p:sldId id="256" r:id="rId2"/>
@@ -20,8 +20,10 @@
     <p:sldId id="263" r:id="rId11"/>
     <p:sldId id="261" r:id="rId12"/>
     <p:sldId id="267" r:id="rId13"/>
-    <p:sldId id="271" r:id="rId14"/>
-    <p:sldId id="270" r:id="rId15"/>
+    <p:sldId id="272" r:id="rId14"/>
+    <p:sldId id="274" r:id="rId15"/>
+    <p:sldId id="271" r:id="rId16"/>
+    <p:sldId id="270" r:id="rId17"/>
   </p:sldIdLst>
   <p:sldSz cx="12192000" cy="6858000"/>
   <p:notesSz cx="6858000" cy="9144000"/>
@@ -149,6 +151,8 @@
           <p14:sldIdLst>
             <p14:sldId id="261"/>
             <p14:sldId id="267"/>
+            <p14:sldId id="272"/>
+            <p14:sldId id="274"/>
           </p14:sldIdLst>
         </p14:section>
         <p14:section name="play" id="{51650CBD-D5EB-4E81-BC1D-E4B85226328A}">
@@ -604,6 +608,90 @@
 </p:notes>
 </file>
 
+<file path=ppt/notesSlides/notesSlide10.xml><?xml version="1.0" encoding="utf-8"?>
+<p:notes xmlns:a="http://schemas.openxmlformats.org/drawingml/2006/main" xmlns:r="http://schemas.openxmlformats.org/officeDocument/2006/relationships" xmlns:p="http://schemas.openxmlformats.org/presentationml/2006/main">
+  <p:cSld>
+    <p:spTree>
+      <p:nvGrpSpPr>
+        <p:cNvPr id="1" name=""/>
+        <p:cNvGrpSpPr/>
+        <p:nvPr/>
+      </p:nvGrpSpPr>
+      <p:grpSpPr>
+        <a:xfrm>
+          <a:off x="0" y="0"/>
+          <a:ext cx="0" cy="0"/>
+          <a:chOff x="0" y="0"/>
+          <a:chExt cx="0" cy="0"/>
+        </a:xfrm>
+      </p:grpSpPr>
+      <p:sp>
+        <p:nvSpPr>
+          <p:cNvPr id="2" name="Folienbildplatzhalter 1"/>
+          <p:cNvSpPr>
+            <a:spLocks noGrp="1" noRot="1" noChangeAspect="1"/>
+          </p:cNvSpPr>
+          <p:nvPr>
+            <p:ph type="sldImg"/>
+          </p:nvPr>
+        </p:nvSpPr>
+        <p:spPr/>
+      </p:sp>
+      <p:sp>
+        <p:nvSpPr>
+          <p:cNvPr id="3" name="Notizenplatzhalter 2"/>
+          <p:cNvSpPr>
+            <a:spLocks noGrp="1"/>
+          </p:cNvSpPr>
+          <p:nvPr>
+            <p:ph type="body" idx="1"/>
+          </p:nvPr>
+        </p:nvSpPr>
+        <p:spPr/>
+        <p:txBody>
+          <a:bodyPr/>
+          <a:lstStyle/>
+          <a:p>
+            <a:endParaRPr lang="de-DE"/>
+          </a:p>
+        </p:txBody>
+      </p:sp>
+      <p:sp>
+        <p:nvSpPr>
+          <p:cNvPr id="4" name="Foliennummernplatzhalter 3"/>
+          <p:cNvSpPr>
+            <a:spLocks noGrp="1"/>
+          </p:cNvSpPr>
+          <p:nvPr>
+            <p:ph type="sldNum" sz="quarter" idx="10"/>
+          </p:nvPr>
+        </p:nvSpPr>
+        <p:spPr/>
+        <p:txBody>
+          <a:bodyPr/>
+          <a:lstStyle/>
+          <a:p>
+            <a:fld id="{CAFA6362-108B-4585-B5DA-0F52B5B4AA37}" type="slidenum">
+              <a:rPr lang="de-DE" smtClean="0"/>
+              <a:t>14</a:t>
+            </a:fld>
+            <a:endParaRPr lang="de-DE"/>
+          </a:p>
+        </p:txBody>
+      </p:sp>
+    </p:spTree>
+    <p:extLst>
+      <p:ext uri="{BB962C8B-B14F-4D97-AF65-F5344CB8AC3E}">
+        <p14:creationId xmlns:p14="http://schemas.microsoft.com/office/powerpoint/2010/main" val="1123726495"/>
+      </p:ext>
+    </p:extLst>
+  </p:cSld>
+  <p:clrMapOvr>
+    <a:masterClrMapping/>
+  </p:clrMapOvr>
+</p:notes>
+</file>
+
 <file path=ppt/notesSlides/notesSlide2.xml><?xml version="1.0" encoding="utf-8"?>
 <p:notes xmlns:a="http://schemas.openxmlformats.org/drawingml/2006/main" xmlns:r="http://schemas.openxmlformats.org/officeDocument/2006/relationships" xmlns:p="http://schemas.openxmlformats.org/presentationml/2006/main">
   <p:cSld>
@@ -1183,6 +1271,90 @@
     <p:extLst>
       <p:ext uri="{BB962C8B-B14F-4D97-AF65-F5344CB8AC3E}">
         <p14:creationId xmlns:p14="http://schemas.microsoft.com/office/powerpoint/2010/main" val="3298616644"/>
+      </p:ext>
+    </p:extLst>
+  </p:cSld>
+  <p:clrMapOvr>
+    <a:masterClrMapping/>
+  </p:clrMapOvr>
+</p:notes>
+</file>
+
+<file path=ppt/notesSlides/notesSlide9.xml><?xml version="1.0" encoding="utf-8"?>
+<p:notes xmlns:a="http://schemas.openxmlformats.org/drawingml/2006/main" xmlns:r="http://schemas.openxmlformats.org/officeDocument/2006/relationships" xmlns:p="http://schemas.openxmlformats.org/presentationml/2006/main">
+  <p:cSld>
+    <p:spTree>
+      <p:nvGrpSpPr>
+        <p:cNvPr id="1" name=""/>
+        <p:cNvGrpSpPr/>
+        <p:nvPr/>
+      </p:nvGrpSpPr>
+      <p:grpSpPr>
+        <a:xfrm>
+          <a:off x="0" y="0"/>
+          <a:ext cx="0" cy="0"/>
+          <a:chOff x="0" y="0"/>
+          <a:chExt cx="0" cy="0"/>
+        </a:xfrm>
+      </p:grpSpPr>
+      <p:sp>
+        <p:nvSpPr>
+          <p:cNvPr id="2" name="Folienbildplatzhalter 1"/>
+          <p:cNvSpPr>
+            <a:spLocks noGrp="1" noRot="1" noChangeAspect="1"/>
+          </p:cNvSpPr>
+          <p:nvPr>
+            <p:ph type="sldImg"/>
+          </p:nvPr>
+        </p:nvSpPr>
+        <p:spPr/>
+      </p:sp>
+      <p:sp>
+        <p:nvSpPr>
+          <p:cNvPr id="3" name="Notizenplatzhalter 2"/>
+          <p:cNvSpPr>
+            <a:spLocks noGrp="1"/>
+          </p:cNvSpPr>
+          <p:nvPr>
+            <p:ph type="body" idx="1"/>
+          </p:nvPr>
+        </p:nvSpPr>
+        <p:spPr/>
+        <p:txBody>
+          <a:bodyPr/>
+          <a:lstStyle/>
+          <a:p>
+            <a:endParaRPr lang="de-DE"/>
+          </a:p>
+        </p:txBody>
+      </p:sp>
+      <p:sp>
+        <p:nvSpPr>
+          <p:cNvPr id="4" name="Foliennummernplatzhalter 3"/>
+          <p:cNvSpPr>
+            <a:spLocks noGrp="1"/>
+          </p:cNvSpPr>
+          <p:nvPr>
+            <p:ph type="sldNum" sz="quarter" idx="10"/>
+          </p:nvPr>
+        </p:nvSpPr>
+        <p:spPr/>
+        <p:txBody>
+          <a:bodyPr/>
+          <a:lstStyle/>
+          <a:p>
+            <a:fld id="{CAFA6362-108B-4585-B5DA-0F52B5B4AA37}" type="slidenum">
+              <a:rPr lang="de-DE" smtClean="0"/>
+              <a:t>13</a:t>
+            </a:fld>
+            <a:endParaRPr lang="de-DE"/>
+          </a:p>
+        </p:txBody>
+      </p:sp>
+    </p:spTree>
+    <p:extLst>
+      <p:ext uri="{BB962C8B-B14F-4D97-AF65-F5344CB8AC3E}">
+        <p14:creationId xmlns:p14="http://schemas.microsoft.com/office/powerpoint/2010/main" val="1556234346"/>
       </p:ext>
     </p:extLst>
   </p:cSld>
@@ -4659,13 +4831,13 @@
   <p:clrMapOvr>
     <a:masterClrMapping/>
   </p:clrMapOvr>
-  <mc:AlternateContent xmlns:mc="http://schemas.openxmlformats.org/markup-compatibility/2006">
-    <mc:Choice xmlns:p14="http://schemas.microsoft.com/office/powerpoint/2010/main" Requires="p14">
+  <mc:AlternateContent xmlns:mc="http://schemas.openxmlformats.org/markup-compatibility/2006" xmlns:p14="http://schemas.microsoft.com/office/powerpoint/2010/main">
+    <mc:Choice Requires="p14">
       <p:transition spd="med" p14:dur="700">
         <p:fade/>
       </p:transition>
     </mc:Choice>
-    <mc:Fallback>
+    <mc:Fallback xmlns="">
       <p:transition spd="med">
         <p:fade/>
       </p:transition>
@@ -4700,6 +4872,283 @@
       </p:grpSpPr>
       <p:sp>
         <p:nvSpPr>
+          <p:cNvPr id="2" name="Titel 1"/>
+          <p:cNvSpPr>
+            <a:spLocks noGrp="1"/>
+          </p:cNvSpPr>
+          <p:nvPr>
+            <p:ph type="title"/>
+          </p:nvPr>
+        </p:nvSpPr>
+        <p:spPr/>
+        <p:txBody>
+          <a:bodyPr/>
+          <a:lstStyle/>
+          <a:p>
+            <a:r>
+              <a:rPr lang="de-DE" dirty="0" smtClean="0"/>
+              <a:t>Infrastruktur</a:t>
+            </a:r>
+            <a:endParaRPr lang="de-DE" dirty="0"/>
+          </a:p>
+        </p:txBody>
+      </p:sp>
+      <p:sp>
+        <p:nvSpPr>
+          <p:cNvPr id="4" name="Fußzeilenplatzhalter 3"/>
+          <p:cNvSpPr>
+            <a:spLocks noGrp="1"/>
+          </p:cNvSpPr>
+          <p:nvPr>
+            <p:ph type="ftr" sz="quarter" idx="11"/>
+          </p:nvPr>
+        </p:nvSpPr>
+        <p:spPr/>
+        <p:txBody>
+          <a:bodyPr/>
+          <a:lstStyle/>
+          <a:p>
+            <a:r>
+              <a:rPr lang="de-DE" smtClean="0"/>
+              <a:t>github.com/10ITX3-CardsAgainstHumanity</a:t>
+            </a:r>
+            <a:endParaRPr lang="de-DE"/>
+          </a:p>
+        </p:txBody>
+      </p:sp>
+      <p:pic>
+        <p:nvPicPr>
+          <p:cNvPr id="6" name="Inhaltsplatzhalter 5"/>
+          <p:cNvPicPr>
+            <a:picLocks noGrp="1" noChangeAspect="1"/>
+          </p:cNvPicPr>
+          <p:nvPr>
+            <p:ph idx="1"/>
+          </p:nvPr>
+        </p:nvPicPr>
+        <p:blipFill>
+          <a:blip r:embed="rId3" cstate="print">
+            <a:extLst>
+              <a:ext uri="{28A0092B-C50C-407E-A947-70E740481C1C}">
+                <a14:useLocalDpi xmlns:a14="http://schemas.microsoft.com/office/drawing/2010/main" val="0"/>
+              </a:ext>
+            </a:extLst>
+          </a:blip>
+          <a:stretch>
+            <a:fillRect/>
+          </a:stretch>
+        </p:blipFill>
+        <p:spPr>
+          <a:xfrm>
+            <a:off x="2614930" y="1825625"/>
+            <a:ext cx="6962140" cy="4351338"/>
+          </a:xfrm>
+        </p:spPr>
+      </p:pic>
+    </p:spTree>
+    <p:extLst>
+      <p:ext uri="{BB962C8B-B14F-4D97-AF65-F5344CB8AC3E}">
+        <p14:creationId xmlns:p14="http://schemas.microsoft.com/office/powerpoint/2010/main" val="866727160"/>
+      </p:ext>
+    </p:extLst>
+  </p:cSld>
+  <p:clrMapOvr>
+    <a:masterClrMapping/>
+  </p:clrMapOvr>
+  <mc:AlternateContent xmlns:mc="http://schemas.openxmlformats.org/markup-compatibility/2006" xmlns:p14="http://schemas.microsoft.com/office/powerpoint/2010/main">
+    <mc:Choice Requires="p14">
+      <p:transition spd="med" p14:dur="700">
+        <p:fade/>
+      </p:transition>
+    </mc:Choice>
+    <mc:Fallback xmlns="">
+      <p:transition spd="med">
+        <p:fade/>
+      </p:transition>
+    </mc:Fallback>
+  </mc:AlternateContent>
+  <p:timing>
+    <p:tnLst>
+      <p:par>
+        <p:cTn id="1" dur="indefinite" restart="never" nodeType="tmRoot"/>
+      </p:par>
+    </p:tnLst>
+  </p:timing>
+</p:sld>
+</file>
+
+<file path=ppt/slides/slide14.xml><?xml version="1.0" encoding="utf-8"?>
+<p:sld xmlns:a="http://schemas.openxmlformats.org/drawingml/2006/main" xmlns:r="http://schemas.openxmlformats.org/officeDocument/2006/relationships" xmlns:p="http://schemas.openxmlformats.org/presentationml/2006/main">
+  <p:cSld>
+    <p:spTree>
+      <p:nvGrpSpPr>
+        <p:cNvPr id="1" name=""/>
+        <p:cNvGrpSpPr/>
+        <p:nvPr/>
+      </p:nvGrpSpPr>
+      <p:grpSpPr>
+        <a:xfrm>
+          <a:off x="0" y="0"/>
+          <a:ext cx="0" cy="0"/>
+          <a:chOff x="0" y="0"/>
+          <a:chExt cx="0" cy="0"/>
+        </a:xfrm>
+      </p:grpSpPr>
+      <p:sp>
+        <p:nvSpPr>
+          <p:cNvPr id="2" name="Titel 1"/>
+          <p:cNvSpPr>
+            <a:spLocks noGrp="1"/>
+          </p:cNvSpPr>
+          <p:nvPr>
+            <p:ph type="title"/>
+          </p:nvPr>
+        </p:nvSpPr>
+        <p:spPr/>
+        <p:txBody>
+          <a:bodyPr/>
+          <a:lstStyle/>
+          <a:p>
+            <a:r>
+              <a:rPr lang="de-DE" dirty="0" smtClean="0"/>
+              <a:t>Infrastruktur</a:t>
+            </a:r>
+            <a:endParaRPr lang="de-DE" dirty="0"/>
+          </a:p>
+        </p:txBody>
+      </p:sp>
+      <p:pic>
+        <p:nvPicPr>
+          <p:cNvPr id="8" name="Inhaltsplatzhalter 7"/>
+          <p:cNvPicPr>
+            <a:picLocks noGrp="1" noChangeAspect="1"/>
+          </p:cNvPicPr>
+          <p:nvPr>
+            <p:ph sz="half" idx="2"/>
+          </p:nvPr>
+        </p:nvPicPr>
+        <p:blipFill>
+          <a:blip r:embed="rId3" cstate="print">
+            <a:extLst>
+              <a:ext uri="{28A0092B-C50C-407E-A947-70E740481C1C}">
+                <a14:useLocalDpi xmlns:a14="http://schemas.microsoft.com/office/drawing/2010/main" val="0"/>
+              </a:ext>
+            </a:extLst>
+          </a:blip>
+          <a:stretch>
+            <a:fillRect/>
+          </a:stretch>
+        </p:blipFill>
+        <p:spPr>
+          <a:xfrm>
+            <a:off x="6172200" y="2425390"/>
+            <a:ext cx="5181600" cy="3151807"/>
+          </a:xfrm>
+        </p:spPr>
+      </p:pic>
+      <p:sp>
+        <p:nvSpPr>
+          <p:cNvPr id="4" name="Fußzeilenplatzhalter 3"/>
+          <p:cNvSpPr>
+            <a:spLocks noGrp="1"/>
+          </p:cNvSpPr>
+          <p:nvPr>
+            <p:ph type="ftr" sz="quarter" idx="11"/>
+          </p:nvPr>
+        </p:nvSpPr>
+        <p:spPr/>
+        <p:txBody>
+          <a:bodyPr/>
+          <a:lstStyle/>
+          <a:p>
+            <a:r>
+              <a:rPr lang="de-DE" smtClean="0"/>
+              <a:t>github.com/10ITX3-CardsAgainstHumanity</a:t>
+            </a:r>
+            <a:endParaRPr lang="de-DE"/>
+          </a:p>
+        </p:txBody>
+      </p:sp>
+      <p:pic>
+        <p:nvPicPr>
+          <p:cNvPr id="7" name="Inhaltsplatzhalter 6"/>
+          <p:cNvPicPr>
+            <a:picLocks noGrp="1" noChangeAspect="1"/>
+          </p:cNvPicPr>
+          <p:nvPr>
+            <p:ph sz="half" idx="1"/>
+          </p:nvPr>
+        </p:nvPicPr>
+        <p:blipFill>
+          <a:blip r:embed="rId4" cstate="print">
+            <a:extLst>
+              <a:ext uri="{28A0092B-C50C-407E-A947-70E740481C1C}">
+                <a14:useLocalDpi xmlns:a14="http://schemas.microsoft.com/office/drawing/2010/main" val="0"/>
+              </a:ext>
+            </a:extLst>
+          </a:blip>
+          <a:stretch>
+            <a:fillRect/>
+          </a:stretch>
+        </p:blipFill>
+        <p:spPr>
+          <a:xfrm>
+            <a:off x="838200" y="2382044"/>
+            <a:ext cx="5181600" cy="3238500"/>
+          </a:xfrm>
+        </p:spPr>
+      </p:pic>
+    </p:spTree>
+    <p:extLst>
+      <p:ext uri="{BB962C8B-B14F-4D97-AF65-F5344CB8AC3E}">
+        <p14:creationId xmlns:p14="http://schemas.microsoft.com/office/powerpoint/2010/main" val="1381528288"/>
+      </p:ext>
+    </p:extLst>
+  </p:cSld>
+  <p:clrMapOvr>
+    <a:masterClrMapping/>
+  </p:clrMapOvr>
+  <mc:AlternateContent xmlns:mc="http://schemas.openxmlformats.org/markup-compatibility/2006" xmlns:p14="http://schemas.microsoft.com/office/powerpoint/2010/main">
+    <mc:Choice Requires="p14">
+      <p:transition spd="med" p14:dur="700">
+        <p:fade/>
+      </p:transition>
+    </mc:Choice>
+    <mc:Fallback xmlns="">
+      <p:transition spd="med">
+        <p:fade/>
+      </p:transition>
+    </mc:Fallback>
+  </mc:AlternateContent>
+  <p:timing>
+    <p:tnLst>
+      <p:par>
+        <p:cTn id="1" dur="indefinite" restart="never" nodeType="tmRoot"/>
+      </p:par>
+    </p:tnLst>
+  </p:timing>
+</p:sld>
+</file>
+
+<file path=ppt/slides/slide15.xml><?xml version="1.0" encoding="utf-8"?>
+<p:sld xmlns:a="http://schemas.openxmlformats.org/drawingml/2006/main" xmlns:r="http://schemas.openxmlformats.org/officeDocument/2006/relationships" xmlns:p="http://schemas.openxmlformats.org/presentationml/2006/main">
+  <p:cSld>
+    <p:spTree>
+      <p:nvGrpSpPr>
+        <p:cNvPr id="1" name=""/>
+        <p:cNvGrpSpPr/>
+        <p:nvPr/>
+      </p:nvGrpSpPr>
+      <p:grpSpPr>
+        <a:xfrm>
+          <a:off x="0" y="0"/>
+          <a:ext cx="0" cy="0"/>
+          <a:chOff x="0" y="0"/>
+          <a:chExt cx="0" cy="0"/>
+        </a:xfrm>
+      </p:grpSpPr>
+      <p:sp>
+        <p:nvSpPr>
           <p:cNvPr id="7" name="Titel 6"/>
           <p:cNvSpPr>
             <a:spLocks noGrp="1"/>
@@ -4794,7 +5243,7 @@
 </p:sld>
 </file>
 
-<file path=ppt/slides/slide14.xml><?xml version="1.0" encoding="utf-8"?>
+<file path=ppt/slides/slide16.xml><?xml version="1.0" encoding="utf-8"?>
 <p:sld xmlns:a="http://schemas.openxmlformats.org/drawingml/2006/main" xmlns:r="http://schemas.openxmlformats.org/officeDocument/2006/relationships" xmlns:p="http://schemas.openxmlformats.org/presentationml/2006/main">
   <p:cSld>
     <p:spTree>
@@ -5297,15 +5746,6 @@
               </a:rPr>
               <a:t>github.com/socketio/socket.io</a:t>
             </a:r>
-            <a:endParaRPr lang="de-DE" sz="1200" dirty="0">
-              <a:solidFill>
-                <a:schemeClr val="tx1">
-                  <a:lumMod val="50000"/>
-                  <a:lumOff val="50000"/>
-                </a:schemeClr>
-              </a:solidFill>
-              <a:latin typeface="+mn-lt"/>
-            </a:endParaRPr>
           </a:p>
         </p:txBody>
       </p:sp>
@@ -5477,15 +5917,6 @@
               </a:rPr>
               <a:t>github.com/socketio/socket.io</a:t>
             </a:r>
-            <a:endParaRPr lang="de-DE" sz="1200" dirty="0">
-              <a:solidFill>
-                <a:schemeClr val="tx1">
-                  <a:lumMod val="50000"/>
-                  <a:lumOff val="50000"/>
-                </a:schemeClr>
-              </a:solidFill>
-              <a:latin typeface="+mn-lt"/>
-            </a:endParaRPr>
           </a:p>
         </p:txBody>
       </p:sp>
@@ -5619,15 +6050,6 @@
               </a:rPr>
               <a:t>github.com/socketio/socket.io</a:t>
             </a:r>
-            <a:endParaRPr lang="de-DE" sz="1200" dirty="0">
-              <a:solidFill>
-                <a:schemeClr val="tx1">
-                  <a:lumMod val="50000"/>
-                  <a:lumOff val="50000"/>
-                </a:schemeClr>
-              </a:solidFill>
-              <a:latin typeface="+mn-lt"/>
-            </a:endParaRPr>
           </a:p>
         </p:txBody>
       </p:sp>
@@ -5761,15 +6183,6 @@
               </a:rPr>
               <a:t>github.com/socketio/socket.io</a:t>
             </a:r>
-            <a:endParaRPr lang="de-DE" sz="1200" dirty="0">
-              <a:solidFill>
-                <a:schemeClr val="tx1">
-                  <a:lumMod val="50000"/>
-                  <a:lumOff val="50000"/>
-                </a:schemeClr>
-              </a:solidFill>
-              <a:latin typeface="+mn-lt"/>
-            </a:endParaRPr>
           </a:p>
         </p:txBody>
       </p:sp>
@@ -5835,13 +6248,13 @@
   <p:clrMapOvr>
     <a:masterClrMapping/>
   </p:clrMapOvr>
-  <mc:AlternateContent xmlns:mc="http://schemas.openxmlformats.org/markup-compatibility/2006">
-    <mc:Choice xmlns:p14="http://schemas.microsoft.com/office/powerpoint/2010/main" Requires="p14">
+  <mc:AlternateContent xmlns:mc="http://schemas.openxmlformats.org/markup-compatibility/2006" xmlns:p14="http://schemas.microsoft.com/office/powerpoint/2010/main">
+    <mc:Choice Requires="p14">
       <p:transition spd="med" p14:dur="700">
         <p:fade/>
       </p:transition>
     </mc:Choice>
-    <mc:Fallback>
+    <mc:Fallback xmlns="">
       <p:transition spd="med">
         <p:fade/>
       </p:transition>

</xml_diff>